<commit_message>
Added lab 10 for spring 2020
</commit_message>
<xml_diff>
--- a/data8/slides/sp20_lab10.pptx
+++ b/data8/slides/sp20_lab10.pptx
@@ -9,10 +9,10 @@
     <p:sldMasterId id="2147483699" r:id="rId5"/>
   </p:sldMasterIdLst>
   <p:notesMasterIdLst>
-    <p:notesMasterId r:id="rId13"/>
+    <p:notesMasterId r:id="rId16"/>
   </p:notesMasterIdLst>
   <p:handoutMasterIdLst>
-    <p:handoutMasterId r:id="rId14"/>
+    <p:handoutMasterId r:id="rId17"/>
   </p:handoutMasterIdLst>
   <p:sldIdLst>
     <p:sldId id="256" r:id="rId6"/>
@@ -21,7 +21,10 @@
     <p:sldId id="300" r:id="rId9"/>
     <p:sldId id="299" r:id="rId10"/>
     <p:sldId id="301" r:id="rId11"/>
-    <p:sldId id="267" r:id="rId12"/>
+    <p:sldId id="302" r:id="rId12"/>
+    <p:sldId id="304" r:id="rId13"/>
+    <p:sldId id="305" r:id="rId14"/>
+    <p:sldId id="267" r:id="rId15"/>
   </p:sldIdLst>
   <p:sldSz cx="9144000" cy="6858000" type="screen4x3"/>
   <p:notesSz cx="6858000" cy="9144000"/>
@@ -205,7 +208,7 @@
           <a:p>
             <a:fld id="{97CB1905-1EEB-6545-B5E2-B70E8868255E}" type="datetimeFigureOut">
               <a:rPr lang="en-US" smtClean="0"/>
-              <a:t>4/23/2020</a:t>
+              <a:t>4/29/2020</a:t>
             </a:fld>
             <a:endParaRPr lang="en-US"/>
           </a:p>
@@ -371,7 +374,7 @@
           <a:p>
             <a:fld id="{5F53F6BF-7462-9046-A2B6-90C29244BD27}" type="datetimeFigureOut">
               <a:rPr lang="en-US" smtClean="0"/>
-              <a:t>4/23/2020</a:t>
+              <a:t>4/29/2020</a:t>
             </a:fld>
             <a:endParaRPr lang="en-US"/>
           </a:p>
@@ -7661,7 +7664,7 @@
               <a:rPr lang="en-US" dirty="0" smtClean="0">
                 <a:latin typeface="Avenir LT Std 45 Book" pitchFamily="34" charset="0"/>
               </a:rPr>
-              <a:t>11</a:t>
+              <a:t>10</a:t>
             </a:r>
             <a:endParaRPr lang="en-US" dirty="0">
               <a:solidFill>
@@ -7690,7 +7693,7 @@
         </p:spPr>
         <p:txBody>
           <a:bodyPr>
-            <a:normAutofit/>
+            <a:normAutofit lnSpcReduction="10000"/>
           </a:bodyPr>
           <a:lstStyle/>
           <a:p>
@@ -7698,8 +7701,11 @@
               <a:rPr lang="en-US" b="1" dirty="0" smtClean="0">
                 <a:latin typeface="Avenir LT Std 45 Book" pitchFamily="34" charset="0"/>
               </a:rPr>
-              <a:t>Classification and k-Nearest Neighbours</a:t>
-            </a:r>
+              <a:t>Classification, k-Nearest Neighbours, and Conditional Probability</a:t>
+            </a:r>
+            <a:endParaRPr lang="en-US" b="1" dirty="0" smtClean="0">
+              <a:latin typeface="Avenir LT Std 45 Book" pitchFamily="34" charset="0"/>
+            </a:endParaRPr>
           </a:p>
           <a:p>
             <a:endParaRPr lang="en-US" b="1" dirty="0">
@@ -7719,8 +7725,11 @@
               <a:rPr lang="en-US" dirty="0" smtClean="0">
                 <a:latin typeface="Avenir LT Std 45 Book" pitchFamily="34" charset="0"/>
               </a:rPr>
-              <a:t>Fall 2019</a:t>
-            </a:r>
+              <a:t>Spring 2020</a:t>
+            </a:r>
+            <a:endParaRPr lang="en-US" dirty="0" smtClean="0">
+              <a:latin typeface="Avenir LT Std 45 Book" pitchFamily="34" charset="0"/>
+            </a:endParaRPr>
           </a:p>
           <a:p>
             <a:endParaRPr lang="en-US" dirty="0">
@@ -7732,7 +7741,7 @@
               <a:rPr lang="en-US" dirty="0" smtClean="0">
                 <a:latin typeface="Avenir LT Std 45 Book" pitchFamily="34" charset="0"/>
               </a:rPr>
-              <a:t>22 November 2019</a:t>
+              <a:t>1 May 2020</a:t>
             </a:r>
             <a:endParaRPr lang="en-US" dirty="0">
               <a:latin typeface="Avenir LT Std 45 Book" pitchFamily="34" charset="0"/>
@@ -7744,6 +7753,121 @@
     <p:extLst>
       <p:ext uri="{BB962C8B-B14F-4D97-AF65-F5344CB8AC3E}">
         <p14:creationId xmlns:p14="http://schemas.microsoft.com/office/powerpoint/2010/main" val="1276399452"/>
+      </p:ext>
+    </p:extLst>
+  </p:cSld>
+  <p:clrMapOvr>
+    <a:masterClrMapping/>
+  </p:clrMapOvr>
+  <p:timing>
+    <p:tnLst>
+      <p:par>
+        <p:cTn id="1" dur="indefinite" restart="never" nodeType="tmRoot"/>
+      </p:par>
+    </p:tnLst>
+  </p:timing>
+</p:sld>
+</file>
+
+<file path=ppt/slides/slide10.xml><?xml version="1.0" encoding="utf-8"?>
+<p:sld xmlns:a="http://schemas.openxmlformats.org/drawingml/2006/main" xmlns:r="http://schemas.openxmlformats.org/officeDocument/2006/relationships" xmlns:p="http://schemas.openxmlformats.org/presentationml/2006/main">
+  <p:cSld>
+    <p:spTree>
+      <p:nvGrpSpPr>
+        <p:cNvPr id="1" name=""/>
+        <p:cNvGrpSpPr/>
+        <p:nvPr/>
+      </p:nvGrpSpPr>
+      <p:grpSpPr>
+        <a:xfrm>
+          <a:off x="0" y="0"/>
+          <a:ext cx="0" cy="0"/>
+          <a:chOff x="0" y="0"/>
+          <a:chExt cx="0" cy="0"/>
+        </a:xfrm>
+      </p:grpSpPr>
+      <p:sp>
+        <p:nvSpPr>
+          <p:cNvPr id="2" name="Title 1"/>
+          <p:cNvSpPr>
+            <a:spLocks noGrp="1"/>
+          </p:cNvSpPr>
+          <p:nvPr>
+            <p:ph type="title"/>
+          </p:nvPr>
+        </p:nvSpPr>
+        <p:spPr>
+          <a:xfrm>
+            <a:off x="457200" y="449932"/>
+            <a:ext cx="8286750" cy="1150353"/>
+          </a:xfrm>
+        </p:spPr>
+        <p:txBody>
+          <a:bodyPr/>
+          <a:lstStyle/>
+          <a:p>
+            <a:r>
+              <a:rPr lang="en-CA" dirty="0" smtClean="0">
+                <a:latin typeface="+mn-lt"/>
+              </a:rPr>
+              <a:t>Announcements</a:t>
+            </a:r>
+            <a:endParaRPr lang="en-CA" dirty="0">
+              <a:latin typeface="+mn-lt"/>
+            </a:endParaRPr>
+          </a:p>
+        </p:txBody>
+      </p:sp>
+      <p:sp>
+        <p:nvSpPr>
+          <p:cNvPr id="3" name="Content Placeholder 2"/>
+          <p:cNvSpPr>
+            <a:spLocks noGrp="1"/>
+          </p:cNvSpPr>
+          <p:nvPr>
+            <p:ph idx="1"/>
+          </p:nvPr>
+        </p:nvSpPr>
+        <p:spPr>
+          <a:xfrm>
+            <a:off x="457200" y="1756947"/>
+            <a:ext cx="8286750" cy="3596103"/>
+          </a:xfrm>
+        </p:spPr>
+        <p:txBody>
+          <a:bodyPr/>
+          <a:lstStyle/>
+          <a:p>
+            <a:r>
+              <a:rPr lang="en-CA" dirty="0" smtClean="0">
+                <a:latin typeface="+mn-lt"/>
+              </a:rPr>
+              <a:t>Project 3 due Friday 5/1</a:t>
+            </a:r>
+          </a:p>
+          <a:p>
+            <a:r>
+              <a:rPr lang="en-CA" dirty="0" smtClean="0">
+                <a:latin typeface="+mn-lt"/>
+              </a:rPr>
+              <a:t>Final Topical Review Labs Next Week! See Piazza for schedule, slides, </a:t>
+            </a:r>
+            <a:r>
+              <a:rPr lang="en-CA" smtClean="0">
+                <a:latin typeface="+mn-lt"/>
+              </a:rPr>
+              <a:t>and topics</a:t>
+            </a:r>
+            <a:endParaRPr lang="en-CA" dirty="0">
+              <a:latin typeface="+mn-lt"/>
+            </a:endParaRPr>
+          </a:p>
+        </p:txBody>
+      </p:sp>
+    </p:spTree>
+    <p:extLst>
+      <p:ext uri="{BB962C8B-B14F-4D97-AF65-F5344CB8AC3E}">
+        <p14:creationId xmlns:p14="http://schemas.microsoft.com/office/powerpoint/2010/main" val="203414778"/>
       </p:ext>
     </p:extLst>
   </p:cSld>
@@ -7835,16 +7959,43 @@
               <a:rPr lang="en-CA" dirty="0" smtClean="0">
                 <a:latin typeface="+mn-lt"/>
               </a:rPr>
-              <a:t>Goal: Predict categorical data</a:t>
-            </a:r>
-          </a:p>
-          <a:p>
+              <a:t>Goal: Predict </a:t>
+            </a:r>
             <a:r>
               <a:rPr lang="en-CA" dirty="0" smtClean="0">
                 <a:latin typeface="+mn-lt"/>
               </a:rPr>
-              <a:t>In this course, we will use known, labelled data points to predict the label of unknown data points</a:t>
-            </a:r>
+              <a:t>labels of categorical </a:t>
+            </a:r>
+            <a:r>
+              <a:rPr lang="en-CA" dirty="0" smtClean="0">
+                <a:latin typeface="+mn-lt"/>
+              </a:rPr>
+              <a:t>data</a:t>
+            </a:r>
+          </a:p>
+          <a:p>
+            <a:r>
+              <a:rPr lang="en-CA" dirty="0" smtClean="0">
+                <a:latin typeface="+mn-lt"/>
+              </a:rPr>
+              <a:t>In Data 8: Use </a:t>
+            </a:r>
+            <a:r>
+              <a:rPr lang="en-CA" dirty="0" smtClean="0">
+                <a:latin typeface="+mn-lt"/>
+              </a:rPr>
+              <a:t>known, labelled data points to predict the label of unknown data </a:t>
+            </a:r>
+            <a:r>
+              <a:rPr lang="en-CA" dirty="0" smtClean="0">
+                <a:latin typeface="+mn-lt"/>
+              </a:rPr>
+              <a:t>points in a supervised manner</a:t>
+            </a:r>
+            <a:endParaRPr lang="en-CA" dirty="0" smtClean="0">
+              <a:latin typeface="+mn-lt"/>
+            </a:endParaRPr>
           </a:p>
           <a:p>
             <a:r>
@@ -8364,8 +8515,29 @@
               <a:rPr lang="en-CA" dirty="0" smtClean="0">
                 <a:latin typeface="+mn-lt"/>
               </a:rPr>
-              <a:t>Sort all the data points based on the calculated distance</a:t>
-            </a:r>
+              <a:t>Sort all the data points based on the calculated </a:t>
+            </a:r>
+            <a:r>
+              <a:rPr lang="en-CA" dirty="0" smtClean="0">
+                <a:latin typeface="+mn-lt"/>
+              </a:rPr>
+              <a:t>distance</a:t>
+            </a:r>
+          </a:p>
+          <a:p>
+            <a:pPr marL="857250" lvl="1" indent="-457200">
+              <a:buFont typeface="+mj-lt"/>
+              <a:buAutoNum type="alphaLcPeriod"/>
+            </a:pPr>
+            <a:r>
+              <a:rPr lang="en-CA" dirty="0" smtClean="0">
+                <a:latin typeface="+mn-lt"/>
+              </a:rPr>
+              <a:t>From closest (smallest distance) to farthest (largest distance)</a:t>
+            </a:r>
+            <a:endParaRPr lang="en-CA" dirty="0" smtClean="0">
+              <a:latin typeface="+mn-lt"/>
+            </a:endParaRPr>
           </a:p>
           <a:p>
             <a:pPr marL="457200" indent="-457200">
@@ -8376,7 +8548,37 @@
               <a:rPr lang="en-CA" dirty="0" smtClean="0">
                 <a:latin typeface="+mn-lt"/>
               </a:rPr>
-              <a:t>Take the k closest data points (“neighbours”) and find their labels</a:t>
+              <a:t>Take </a:t>
+            </a:r>
+            <a:r>
+              <a:rPr lang="en-CA" i="1" dirty="0" smtClean="0">
+                <a:latin typeface="+mn-lt"/>
+              </a:rPr>
+              <a:t>k</a:t>
+            </a:r>
+            <a:r>
+              <a:rPr lang="en-CA" dirty="0" smtClean="0">
+                <a:latin typeface="+mn-lt"/>
+              </a:rPr>
+              <a:t> </a:t>
+            </a:r>
+            <a:r>
+              <a:rPr lang="en-CA" dirty="0" smtClean="0">
+                <a:latin typeface="+mn-lt"/>
+              </a:rPr>
+              <a:t>closest data points (“neighbours”) and </a:t>
+            </a:r>
+            <a:r>
+              <a:rPr lang="en-CA" dirty="0" smtClean="0">
+                <a:latin typeface="+mn-lt"/>
+              </a:rPr>
+              <a:t>get their </a:t>
+            </a:r>
+            <a:r>
+              <a:rPr lang="en-CA" dirty="0" smtClean="0">
+                <a:latin typeface="+mn-lt"/>
+              </a:rPr>
+              <a:t>labels</a:t>
             </a:r>
           </a:p>
           <a:p>
@@ -8462,8 +8664,8 @@
           </a:p>
         </p:txBody>
       </p:sp>
-      <mc:AlternateContent xmlns:mc="http://schemas.openxmlformats.org/markup-compatibility/2006" xmlns:a14="http://schemas.microsoft.com/office/drawing/2010/main">
-        <mc:Choice Requires="a14">
+      <mc:AlternateContent xmlns:mc="http://schemas.openxmlformats.org/markup-compatibility/2006">
+        <mc:Choice xmlns:a14="http://schemas.microsoft.com/office/drawing/2010/main" Requires="a14">
           <p:sp>
             <p:nvSpPr>
               <p:cNvPr id="3" name="Content Placeholder 2"/>
@@ -8490,13 +8692,31 @@
                   <a:rPr lang="en-CA" dirty="0" smtClean="0">
                     <a:latin typeface="+mn-lt"/>
                   </a:rPr>
-                  <a:t>Before starting to classify data, we often have to </a:t>
+                  <a:t>Before we classify </a:t>
+                </a:r>
+                <a:r>
+                  <a:rPr lang="en-CA" dirty="0" smtClean="0">
+                    <a:latin typeface="+mn-lt"/>
+                  </a:rPr>
+                  <a:t>data, we </a:t>
+                </a:r>
+                <a:r>
+                  <a:rPr lang="en-CA" dirty="0" smtClean="0">
+                    <a:latin typeface="+mn-lt"/>
+                  </a:rPr>
+                  <a:t>usually </a:t>
                 </a:r>
                 <a:r>
                   <a:rPr lang="en-CA" b="1" dirty="0" smtClean="0">
                     <a:latin typeface="+mn-lt"/>
                   </a:rPr>
-                  <a:t>standardize data first</a:t>
+                  <a:t>standardize </a:t>
+                </a:r>
+                <a:r>
+                  <a:rPr lang="en-CA" b="1" dirty="0" smtClean="0">
+                    <a:latin typeface="+mn-lt"/>
+                  </a:rPr>
+                  <a:t>data first</a:t>
                 </a:r>
                 <a:endParaRPr lang="en-CA" dirty="0" smtClean="0">
                   <a:latin typeface="+mn-lt"/>
@@ -8533,25 +8753,25 @@
                   <m:oMath xmlns:m="http://schemas.openxmlformats.org/officeDocument/2006/math">
                     <m:r>
                       <a:rPr lang="en-CA" b="0" i="1" smtClean="0">
-                        <a:latin typeface="Cambria Math"/>
+                        <a:latin typeface="+mn-lt"/>
                       </a:rPr>
                       <m:t>𝑆𝑡𝑎𝑛𝑑𝑎𝑟𝑑𝑖𝑧𝑒𝑑</m:t>
                     </m:r>
                     <m:r>
                       <a:rPr lang="en-CA" b="0" i="1" smtClean="0">
-                        <a:latin typeface="Cambria Math"/>
+                        <a:latin typeface="+mn-lt"/>
                       </a:rPr>
                       <m:t> </m:t>
                     </m:r>
                     <m:r>
                       <a:rPr lang="en-CA" b="0" i="1" smtClean="0">
-                        <a:latin typeface="Cambria Math"/>
+                        <a:latin typeface="+mn-lt"/>
                       </a:rPr>
                       <m:t>𝐷𝑎𝑡𝑎</m:t>
                     </m:r>
                     <m:r>
                       <a:rPr lang="en-CA" b="0" i="1" smtClean="0">
-                        <a:latin typeface="Cambria Math"/>
+                        <a:latin typeface="+mn-lt"/>
                       </a:rPr>
                       <m:t>= </m:t>
                     </m:r>
@@ -8559,74 +8779,74 @@
                       <m:fPr>
                         <m:ctrlPr>
                           <a:rPr lang="en-CA" b="0" i="1" smtClean="0">
-                            <a:latin typeface="Cambria Math"/>
+                            <a:latin typeface="+mn-lt"/>
                           </a:rPr>
                         </m:ctrlPr>
                       </m:fPr>
                       <m:num>
                         <m:r>
                           <a:rPr lang="en-CA" b="0" i="1" smtClean="0">
-                            <a:latin typeface="Cambria Math"/>
+                            <a:latin typeface="+mn-lt"/>
                           </a:rPr>
                           <m:t>𝑂𝑟𝑖𝑔𝑖𝑎𝑙</m:t>
                         </m:r>
                         <m:r>
                           <a:rPr lang="en-CA" b="0" i="1" smtClean="0">
-                            <a:latin typeface="Cambria Math"/>
+                            <a:latin typeface="+mn-lt"/>
                           </a:rPr>
                           <m:t> </m:t>
                         </m:r>
                         <m:r>
                           <a:rPr lang="en-CA" b="0" i="1" smtClean="0">
-                            <a:latin typeface="Cambria Math"/>
+                            <a:latin typeface="+mn-lt"/>
                           </a:rPr>
                           <m:t>𝐷𝑎𝑡𝑎</m:t>
                         </m:r>
                         <m:r>
                           <a:rPr lang="en-CA" b="0" i="1" smtClean="0">
-                            <a:latin typeface="Cambria Math"/>
+                            <a:latin typeface="+mn-lt"/>
                           </a:rPr>
                           <m:t> −</m:t>
                         </m:r>
                         <m:r>
                           <a:rPr lang="en-CA" b="0" i="1" smtClean="0">
-                            <a:latin typeface="Cambria Math"/>
+                            <a:latin typeface="+mn-lt"/>
                           </a:rPr>
                           <m:t>𝐴𝑣𝑒𝑟𝑎𝑔𝑒</m:t>
                         </m:r>
                         <m:r>
                           <a:rPr lang="en-CA" b="0" i="1" smtClean="0">
-                            <a:latin typeface="Cambria Math"/>
+                            <a:latin typeface="+mn-lt"/>
                           </a:rPr>
                           <m:t> </m:t>
                         </m:r>
                         <m:r>
                           <a:rPr lang="en-CA" b="0" i="1" smtClean="0">
-                            <a:latin typeface="Cambria Math"/>
+                            <a:latin typeface="+mn-lt"/>
                           </a:rPr>
                           <m:t>𝑜𝑓</m:t>
                         </m:r>
                         <m:r>
                           <a:rPr lang="en-CA" b="0" i="1" smtClean="0">
-                            <a:latin typeface="Cambria Math"/>
+                            <a:latin typeface="+mn-lt"/>
                           </a:rPr>
                           <m:t> </m:t>
                         </m:r>
                         <m:r>
                           <a:rPr lang="en-CA" b="0" i="1" smtClean="0">
-                            <a:latin typeface="Cambria Math"/>
+                            <a:latin typeface="+mn-lt"/>
                           </a:rPr>
                           <m:t>𝑂𝑟𝑖𝑔𝑖𝑛𝑎𝑙</m:t>
                         </m:r>
                         <m:r>
                           <a:rPr lang="en-CA" b="0" i="1" smtClean="0">
-                            <a:latin typeface="Cambria Math"/>
+                            <a:latin typeface="+mn-lt"/>
                           </a:rPr>
                           <m:t> </m:t>
                         </m:r>
                         <m:r>
                           <a:rPr lang="en-CA" b="0" i="1" smtClean="0">
-                            <a:latin typeface="Cambria Math"/>
+                            <a:latin typeface="+mn-lt"/>
                           </a:rPr>
                           <m:t>𝐷𝑎𝑡𝑎</m:t>
                         </m:r>
@@ -8634,55 +8854,55 @@
                       <m:den>
                         <m:r>
                           <a:rPr lang="en-CA" b="0" i="1" smtClean="0">
-                            <a:latin typeface="Cambria Math"/>
+                            <a:latin typeface="+mn-lt"/>
                           </a:rPr>
                           <m:t>𝑆𝑡𝑎𝑛𝑑𝑎𝑟𝑑</m:t>
                         </m:r>
                         <m:r>
                           <a:rPr lang="en-CA" b="0" i="1" smtClean="0">
-                            <a:latin typeface="Cambria Math"/>
+                            <a:latin typeface="+mn-lt"/>
                           </a:rPr>
                           <m:t> </m:t>
                         </m:r>
                         <m:r>
                           <a:rPr lang="en-CA" b="0" i="1" smtClean="0">
-                            <a:latin typeface="Cambria Math"/>
+                            <a:latin typeface="+mn-lt"/>
                           </a:rPr>
                           <m:t>𝐷𝑒𝑣𝑖𝑎𝑡𝑖𝑜𝑛</m:t>
                         </m:r>
                         <m:r>
                           <a:rPr lang="en-CA" b="0" i="1" smtClean="0">
-                            <a:latin typeface="Cambria Math"/>
+                            <a:latin typeface="+mn-lt"/>
                           </a:rPr>
                           <m:t> </m:t>
                         </m:r>
                         <m:r>
                           <a:rPr lang="en-CA" b="0" i="1" smtClean="0">
-                            <a:latin typeface="Cambria Math"/>
+                            <a:latin typeface="+mn-lt"/>
                           </a:rPr>
                           <m:t>𝑜𝑓</m:t>
                         </m:r>
                         <m:r>
                           <a:rPr lang="en-CA" b="0" i="1" smtClean="0">
-                            <a:latin typeface="Cambria Math"/>
+                            <a:latin typeface="+mn-lt"/>
                           </a:rPr>
                           <m:t> </m:t>
                         </m:r>
                         <m:r>
                           <a:rPr lang="en-CA" b="0" i="1" smtClean="0">
-                            <a:latin typeface="Cambria Math"/>
+                            <a:latin typeface="+mn-lt"/>
                           </a:rPr>
                           <m:t>𝑂𝑟𝑖𝑔𝑖𝑛𝑎𝑙</m:t>
                         </m:r>
                         <m:r>
                           <a:rPr lang="en-CA" b="0" i="1" smtClean="0">
-                            <a:latin typeface="Cambria Math"/>
+                            <a:latin typeface="+mn-lt"/>
                           </a:rPr>
                           <m:t> </m:t>
                         </m:r>
                         <m:r>
                           <a:rPr lang="en-CA" b="0" i="1" smtClean="0">
-                            <a:latin typeface="Cambria Math"/>
+                            <a:latin typeface="+mn-lt"/>
                           </a:rPr>
                           <m:t>𝐷𝑎𝑡𝑎</m:t>
                         </m:r>
@@ -8697,7 +8917,7 @@
             </p:txBody>
           </p:sp>
         </mc:Choice>
-        <mc:Fallback xmlns="">
+        <mc:Fallback>
           <p:sp>
             <p:nvSpPr>
               <p:cNvPr id="3" name="Content Placeholder 2"/>
@@ -8796,7 +9016,7 @@
               <a:rPr lang="en-CA" dirty="0" smtClean="0">
                 <a:latin typeface="+mn-lt"/>
               </a:rPr>
-              <a:t>Announcements</a:t>
+              <a:t>Confusion Matrix Example</a:t>
             </a:r>
             <a:endParaRPr lang="en-CA" dirty="0">
               <a:latin typeface="+mn-lt"/>
@@ -8804,20 +9024,360 @@
           </a:p>
         </p:txBody>
       </p:sp>
+      <p:graphicFrame>
+        <p:nvGraphicFramePr>
+          <p:cNvPr id="4" name="Content Placeholder 3"/>
+          <p:cNvGraphicFramePr>
+            <a:graphicFrameLocks noGrp="1"/>
+          </p:cNvGraphicFramePr>
+          <p:nvPr>
+            <p:ph idx="1"/>
+            <p:extLst>
+              <p:ext uri="{D42A27DB-BD31-4B8C-83A1-F6EECF244321}">
+                <p14:modId xmlns:p14="http://schemas.microsoft.com/office/powerpoint/2010/main" val="3186947581"/>
+              </p:ext>
+            </p:extLst>
+          </p:nvPr>
+        </p:nvGraphicFramePr>
+        <p:xfrm>
+          <a:off x="457200" y="1757363"/>
+          <a:ext cx="8286750" cy="1112520"/>
+        </p:xfrm>
+        <a:graphic>
+          <a:graphicData uri="http://schemas.openxmlformats.org/drawingml/2006/table">
+            <a:tbl>
+              <a:tblPr firstRow="1" bandRow="1">
+                <a:tableStyleId>{5C22544A-7EE6-4342-B048-85BDC9FD1C3A}</a:tableStyleId>
+              </a:tblPr>
+              <a:tblGrid>
+                <a:gridCol w="2981325"/>
+                <a:gridCol w="2847975"/>
+                <a:gridCol w="2457450"/>
+              </a:tblGrid>
+              <a:tr h="370840">
+                <a:tc>
+                  <a:txBody>
+                    <a:bodyPr/>
+                    <a:lstStyle/>
+                    <a:p>
+                      <a:pPr algn="ctr"/>
+                      <a:endParaRPr lang="en-CA" dirty="0"/>
+                    </a:p>
+                  </a:txBody>
+                  <a:tcPr anchor="ctr"/>
+                </a:tc>
+                <a:tc>
+                  <a:txBody>
+                    <a:bodyPr/>
+                    <a:lstStyle/>
+                    <a:p>
+                      <a:pPr algn="ctr"/>
+                      <a:r>
+                        <a:rPr lang="en-CA" dirty="0" smtClean="0"/>
+                        <a:t>True Label: Positive</a:t>
+                      </a:r>
+                      <a:endParaRPr lang="en-CA" dirty="0"/>
+                    </a:p>
+                  </a:txBody>
+                  <a:tcPr anchor="ctr"/>
+                </a:tc>
+                <a:tc>
+                  <a:txBody>
+                    <a:bodyPr/>
+                    <a:lstStyle/>
+                    <a:p>
+                      <a:pPr algn="ctr"/>
+                      <a:r>
+                        <a:rPr lang="en-CA" dirty="0" smtClean="0"/>
+                        <a:t>True Label: Negative</a:t>
+                      </a:r>
+                      <a:endParaRPr lang="en-CA" dirty="0"/>
+                    </a:p>
+                  </a:txBody>
+                  <a:tcPr anchor="ctr"/>
+                </a:tc>
+              </a:tr>
+              <a:tr h="370840">
+                <a:tc>
+                  <a:txBody>
+                    <a:bodyPr/>
+                    <a:lstStyle/>
+                    <a:p>
+                      <a:pPr algn="ctr"/>
+                      <a:r>
+                        <a:rPr lang="en-CA" dirty="0" smtClean="0"/>
+                        <a:t>Predicted Label: Positive</a:t>
+                      </a:r>
+                      <a:endParaRPr lang="en-CA" dirty="0"/>
+                    </a:p>
+                  </a:txBody>
+                  <a:tcPr anchor="ctr"/>
+                </a:tc>
+                <a:tc>
+                  <a:txBody>
+                    <a:bodyPr/>
+                    <a:lstStyle/>
+                    <a:p>
+                      <a:pPr algn="ctr"/>
+                      <a:r>
+                        <a:rPr lang="en-CA" dirty="0" smtClean="0"/>
+                        <a:t>True Positive</a:t>
+                      </a:r>
+                      <a:endParaRPr lang="en-CA" dirty="0"/>
+                    </a:p>
+                  </a:txBody>
+                  <a:tcPr anchor="ctr"/>
+                </a:tc>
+                <a:tc>
+                  <a:txBody>
+                    <a:bodyPr/>
+                    <a:lstStyle/>
+                    <a:p>
+                      <a:pPr algn="ctr"/>
+                      <a:r>
+                        <a:rPr lang="en-CA" dirty="0" smtClean="0"/>
+                        <a:t>False</a:t>
+                      </a:r>
+                      <a:r>
+                        <a:rPr lang="en-CA" baseline="0" dirty="0" smtClean="0"/>
+                        <a:t> Positive</a:t>
+                      </a:r>
+                      <a:endParaRPr lang="en-CA" dirty="0"/>
+                    </a:p>
+                  </a:txBody>
+                  <a:tcPr anchor="ctr"/>
+                </a:tc>
+              </a:tr>
+              <a:tr h="370840">
+                <a:tc>
+                  <a:txBody>
+                    <a:bodyPr/>
+                    <a:lstStyle/>
+                    <a:p>
+                      <a:pPr algn="ctr"/>
+                      <a:r>
+                        <a:rPr lang="en-CA" dirty="0" smtClean="0"/>
+                        <a:t>Predicted Label: Negative</a:t>
+                      </a:r>
+                      <a:endParaRPr lang="en-CA" dirty="0"/>
+                    </a:p>
+                  </a:txBody>
+                  <a:tcPr anchor="ctr"/>
+                </a:tc>
+                <a:tc>
+                  <a:txBody>
+                    <a:bodyPr/>
+                    <a:lstStyle/>
+                    <a:p>
+                      <a:pPr algn="ctr"/>
+                      <a:r>
+                        <a:rPr lang="en-CA" dirty="0" smtClean="0"/>
+                        <a:t>False Negative</a:t>
+                      </a:r>
+                      <a:endParaRPr lang="en-CA" dirty="0"/>
+                    </a:p>
+                  </a:txBody>
+                  <a:tcPr anchor="ctr"/>
+                </a:tc>
+                <a:tc>
+                  <a:txBody>
+                    <a:bodyPr/>
+                    <a:lstStyle/>
+                    <a:p>
+                      <a:pPr algn="ctr"/>
+                      <a:r>
+                        <a:rPr lang="en-CA" dirty="0" smtClean="0"/>
+                        <a:t>True Negative</a:t>
+                      </a:r>
+                      <a:endParaRPr lang="en-CA" dirty="0"/>
+                    </a:p>
+                  </a:txBody>
+                  <a:tcPr anchor="ctr"/>
+                </a:tc>
+              </a:tr>
+            </a:tbl>
+          </a:graphicData>
+        </a:graphic>
+      </p:graphicFrame>
       <p:sp>
         <p:nvSpPr>
-          <p:cNvPr id="3" name="Content Placeholder 2"/>
+          <p:cNvPr id="5" name="TextBox 4"/>
+          <p:cNvSpPr txBox="1"/>
+          <p:nvPr/>
+        </p:nvSpPr>
+        <p:spPr>
+          <a:xfrm>
+            <a:off x="457200" y="2981325"/>
+            <a:ext cx="8286750" cy="2585323"/>
+          </a:xfrm>
+          <a:prstGeom prst="rect">
+            <a:avLst/>
+          </a:prstGeom>
+          <a:noFill/>
+        </p:spPr>
+        <p:txBody>
+          <a:bodyPr wrap="square" rtlCol="0">
+            <a:spAutoFit/>
+          </a:bodyPr>
+          <a:lstStyle/>
+          <a:p>
+            <a:pPr marL="285750" indent="-285750">
+              <a:buFont typeface="Arial" panose="020B0604020202020204" pitchFamily="34" charset="0"/>
+              <a:buChar char="•"/>
+            </a:pPr>
+            <a:r>
+              <a:rPr lang="en-CA" dirty="0" smtClean="0">
+                <a:solidFill>
+                  <a:srgbClr val="2D637F"/>
+                </a:solidFill>
+              </a:rPr>
+              <a:t>The above is an example of a </a:t>
+            </a:r>
+            <a:r>
+              <a:rPr lang="en-CA" b="1" dirty="0" smtClean="0">
+                <a:solidFill>
+                  <a:srgbClr val="2D637F"/>
+                </a:solidFill>
+              </a:rPr>
+              <a:t>confusion matrix </a:t>
+            </a:r>
+            <a:r>
+              <a:rPr lang="en-CA" dirty="0" smtClean="0">
+                <a:solidFill>
+                  <a:srgbClr val="2D637F"/>
+                </a:solidFill>
+              </a:rPr>
+              <a:t> used for classification with two labels, Positive and Negative.</a:t>
+            </a:r>
+            <a:endParaRPr lang="en-CA" dirty="0">
+              <a:solidFill>
+                <a:srgbClr val="2D637F"/>
+              </a:solidFill>
+            </a:endParaRPr>
+          </a:p>
+          <a:p>
+            <a:pPr marL="285750" indent="-285750">
+              <a:buFont typeface="Arial" panose="020B0604020202020204" pitchFamily="34" charset="0"/>
+              <a:buChar char="•"/>
+            </a:pPr>
+            <a:r>
+              <a:rPr lang="en-CA" dirty="0" smtClean="0">
+                <a:solidFill>
+                  <a:srgbClr val="2D637F"/>
+                </a:solidFill>
+              </a:rPr>
+              <a:t>Example: A medical screening is conducted to predict whether or not a patient has cancer</a:t>
+            </a:r>
+          </a:p>
+          <a:p>
+            <a:pPr marL="742950" lvl="1" indent="-285750">
+              <a:buFont typeface="Arial" panose="020B0604020202020204" pitchFamily="34" charset="0"/>
+              <a:buChar char="•"/>
+            </a:pPr>
+            <a:r>
+              <a:rPr lang="en-CA" dirty="0" smtClean="0">
+                <a:solidFill>
+                  <a:srgbClr val="2D637F"/>
+                </a:solidFill>
+              </a:rPr>
+              <a:t>True Positive: Patient has cancer and screening says they do</a:t>
+            </a:r>
+          </a:p>
+          <a:p>
+            <a:pPr marL="742950" lvl="1" indent="-285750">
+              <a:buFont typeface="Arial" panose="020B0604020202020204" pitchFamily="34" charset="0"/>
+              <a:buChar char="•"/>
+            </a:pPr>
+            <a:r>
+              <a:rPr lang="en-CA" dirty="0" smtClean="0">
+                <a:solidFill>
+                  <a:srgbClr val="2D637F"/>
+                </a:solidFill>
+              </a:rPr>
+              <a:t>False Negative: Patient has cancer but screening says they don’t</a:t>
+            </a:r>
+          </a:p>
+          <a:p>
+            <a:pPr marL="742950" lvl="1" indent="-285750">
+              <a:buFont typeface="Arial" panose="020B0604020202020204" pitchFamily="34" charset="0"/>
+              <a:buChar char="•"/>
+            </a:pPr>
+            <a:r>
+              <a:rPr lang="en-CA" dirty="0" smtClean="0">
+                <a:solidFill>
+                  <a:srgbClr val="2D637F"/>
+                </a:solidFill>
+              </a:rPr>
+              <a:t>False Positive: Patient doesn’t have cancer but screening says they do</a:t>
+            </a:r>
+          </a:p>
+          <a:p>
+            <a:pPr marL="742950" lvl="1" indent="-285750">
+              <a:buFont typeface="Arial" panose="020B0604020202020204" pitchFamily="34" charset="0"/>
+              <a:buChar char="•"/>
+            </a:pPr>
+            <a:r>
+              <a:rPr lang="en-CA" dirty="0" smtClean="0">
+                <a:solidFill>
+                  <a:srgbClr val="2D637F"/>
+                </a:solidFill>
+              </a:rPr>
+              <a:t>True Negative: Patient doesn’t have cancer and screening says they don’t</a:t>
+            </a:r>
+          </a:p>
+        </p:txBody>
+      </p:sp>
+    </p:spTree>
+    <p:extLst>
+      <p:ext uri="{BB962C8B-B14F-4D97-AF65-F5344CB8AC3E}">
+        <p14:creationId xmlns:p14="http://schemas.microsoft.com/office/powerpoint/2010/main" val="3610471412"/>
+      </p:ext>
+    </p:extLst>
+  </p:cSld>
+  <p:clrMapOvr>
+    <a:masterClrMapping/>
+  </p:clrMapOvr>
+  <p:timing>
+    <p:tnLst>
+      <p:par>
+        <p:cTn id="1" dur="indefinite" restart="never" nodeType="tmRoot"/>
+      </p:par>
+    </p:tnLst>
+  </p:timing>
+</p:sld>
+</file>
+
+<file path=ppt/slides/slide8.xml><?xml version="1.0" encoding="utf-8"?>
+<p:sld xmlns:a="http://schemas.openxmlformats.org/drawingml/2006/main" xmlns:r="http://schemas.openxmlformats.org/officeDocument/2006/relationships" xmlns:p="http://schemas.openxmlformats.org/presentationml/2006/main">
+  <p:cSld>
+    <p:spTree>
+      <p:nvGrpSpPr>
+        <p:cNvPr id="1" name=""/>
+        <p:cNvGrpSpPr/>
+        <p:nvPr/>
+      </p:nvGrpSpPr>
+      <p:grpSpPr>
+        <a:xfrm>
+          <a:off x="0" y="0"/>
+          <a:ext cx="0" cy="0"/>
+          <a:chOff x="0" y="0"/>
+          <a:chExt cx="0" cy="0"/>
+        </a:xfrm>
+      </p:grpSpPr>
+      <p:sp>
+        <p:nvSpPr>
+          <p:cNvPr id="2" name="Title 1"/>
           <p:cNvSpPr>
             <a:spLocks noGrp="1"/>
           </p:cNvSpPr>
           <p:nvPr>
-            <p:ph idx="1"/>
+            <p:ph type="title"/>
           </p:nvPr>
         </p:nvSpPr>
         <p:spPr>
           <a:xfrm>
-            <a:off x="457200" y="1756947"/>
-            <a:ext cx="8286750" cy="3596103"/>
+            <a:off x="457200" y="449932"/>
+            <a:ext cx="8286750" cy="1150353"/>
           </a:xfrm>
         </p:spPr>
         <p:txBody>
@@ -8825,125 +9385,10 @@
           <a:lstStyle/>
           <a:p>
             <a:r>
-              <a:rPr lang="en-CA" dirty="0">
-                <a:latin typeface="+mn-lt"/>
-              </a:rPr>
-              <a:t>Project 3 checkpoint 1 is due </a:t>
-            </a:r>
-            <a:r>
               <a:rPr lang="en-CA" dirty="0" smtClean="0">
                 <a:latin typeface="+mn-lt"/>
               </a:rPr>
-              <a:t>today (11/22)</a:t>
-            </a:r>
-          </a:p>
-          <a:p>
-            <a:pPr lvl="1"/>
-            <a:r>
-              <a:rPr lang="en-CA" dirty="0" smtClean="0">
-                <a:latin typeface="+mn-lt"/>
-              </a:rPr>
-              <a:t>Final </a:t>
-            </a:r>
-            <a:r>
-              <a:rPr lang="en-CA" dirty="0">
-                <a:latin typeface="+mn-lt"/>
-              </a:rPr>
-              <a:t>project deadline is 12/6.</a:t>
-            </a:r>
-          </a:p>
-          <a:p>
-            <a:r>
-              <a:rPr lang="en-CA" dirty="0" smtClean="0">
-                <a:latin typeface="+mn-lt"/>
-              </a:rPr>
-              <a:t>HW12 </a:t>
-            </a:r>
-            <a:r>
-              <a:rPr lang="en-CA" dirty="0">
-                <a:latin typeface="+mn-lt"/>
-              </a:rPr>
-              <a:t>will be released </a:t>
-            </a:r>
-            <a:r>
-              <a:rPr lang="en-CA" dirty="0" smtClean="0">
-                <a:latin typeface="+mn-lt"/>
-              </a:rPr>
-              <a:t>today and </a:t>
-            </a:r>
-            <a:r>
-              <a:rPr lang="en-CA" dirty="0">
-                <a:latin typeface="+mn-lt"/>
-              </a:rPr>
-              <a:t>due on 12/6.</a:t>
-            </a:r>
-          </a:p>
-          <a:p>
-            <a:r>
-              <a:rPr lang="en-CA" dirty="0">
-                <a:latin typeface="+mn-lt"/>
-              </a:rPr>
-              <a:t>Next week is </a:t>
-            </a:r>
-            <a:r>
-              <a:rPr lang="en-CA" dirty="0" smtClean="0">
-                <a:latin typeface="+mn-lt"/>
-              </a:rPr>
-              <a:t>American Thanksgiving:</a:t>
-            </a:r>
-          </a:p>
-          <a:p>
-            <a:pPr lvl="1"/>
-            <a:r>
-              <a:rPr lang="en-CA" dirty="0" smtClean="0">
-                <a:latin typeface="+mn-lt"/>
-              </a:rPr>
-              <a:t>Monday </a:t>
-            </a:r>
-            <a:r>
-              <a:rPr lang="en-CA" dirty="0">
-                <a:latin typeface="+mn-lt"/>
-              </a:rPr>
-              <a:t>lecture will be held as </a:t>
-            </a:r>
-            <a:r>
-              <a:rPr lang="en-CA" dirty="0" smtClean="0">
-                <a:latin typeface="+mn-lt"/>
-              </a:rPr>
-              <a:t>normal</a:t>
-            </a:r>
-          </a:p>
-          <a:p>
-            <a:pPr lvl="1"/>
-            <a:r>
-              <a:rPr lang="en-CA" dirty="0" smtClean="0">
-                <a:latin typeface="+mn-lt"/>
-              </a:rPr>
-              <a:t>No </a:t>
-            </a:r>
-            <a:r>
-              <a:rPr lang="en-CA" dirty="0">
-                <a:latin typeface="+mn-lt"/>
-              </a:rPr>
-              <a:t>lecture on </a:t>
-            </a:r>
-            <a:r>
-              <a:rPr lang="en-CA" dirty="0" smtClean="0">
-                <a:latin typeface="+mn-lt"/>
-              </a:rPr>
-              <a:t>Wednesday-Friday, </a:t>
-            </a:r>
-            <a:r>
-              <a:rPr lang="en-CA" dirty="0">
-                <a:latin typeface="+mn-lt"/>
-              </a:rPr>
-              <a:t>and no lab, office hours, tutoring sections, or assignment </a:t>
-            </a:r>
-            <a:r>
-              <a:rPr lang="en-CA" dirty="0" smtClean="0">
-                <a:latin typeface="+mn-lt"/>
-              </a:rPr>
-              <a:t>deadlines</a:t>
+              <a:t>Conditional Probability</a:t>
             </a:r>
             <a:endParaRPr lang="en-CA" dirty="0">
               <a:latin typeface="+mn-lt"/>
@@ -8951,10 +9396,1415 @@
           </a:p>
         </p:txBody>
       </p:sp>
+      <mc:AlternateContent xmlns:mc="http://schemas.openxmlformats.org/markup-compatibility/2006">
+        <mc:Choice xmlns:a14="http://schemas.microsoft.com/office/drawing/2010/main" Requires="a14">
+          <p:sp>
+            <p:nvSpPr>
+              <p:cNvPr id="3" name="Content Placeholder 2"/>
+              <p:cNvSpPr>
+                <a:spLocks noGrp="1"/>
+              </p:cNvSpPr>
+              <p:nvPr>
+                <p:ph idx="1"/>
+              </p:nvPr>
+            </p:nvSpPr>
+            <p:spPr>
+              <a:xfrm>
+                <a:off x="457200" y="1756947"/>
+                <a:ext cx="8286750" cy="3681828"/>
+              </a:xfrm>
+            </p:spPr>
+            <p:txBody>
+              <a:bodyPr>
+                <a:normAutofit/>
+              </a:bodyPr>
+              <a:lstStyle/>
+              <a:p>
+                <a:r>
+                  <a:rPr lang="en-CA" dirty="0" smtClean="0">
+                    <a:latin typeface="+mn-lt"/>
+                  </a:rPr>
+                  <a:t>Let C and D be events, P denote the probability</a:t>
+                </a:r>
+                <a:endParaRPr lang="en-CA" dirty="0" smtClean="0">
+                  <a:latin typeface="+mn-lt"/>
+                </a:endParaRPr>
+              </a:p>
+              <a:p>
+                <a14:m>
+                  <m:oMath xmlns:m="http://schemas.openxmlformats.org/officeDocument/2006/math">
+                    <m:r>
+                      <m:rPr>
+                        <m:sty m:val="p"/>
+                      </m:rPr>
+                      <a:rPr lang="en-CA" i="1" smtClean="0">
+                        <a:latin typeface="+mn-lt"/>
+                      </a:rPr>
+                      <m:t>P</m:t>
+                    </m:r>
+                    <m:r>
+                      <a:rPr lang="en-CA" b="0" i="1" smtClean="0">
+                        <a:latin typeface="+mn-lt"/>
+                      </a:rPr>
+                      <m:t>(</m:t>
+                    </m:r>
+                    <m:r>
+                      <a:rPr lang="en-CA" b="0" i="1" smtClean="0">
+                        <a:latin typeface="Cambria Math"/>
+                      </a:rPr>
+                      <m:t>𝐶</m:t>
+                    </m:r>
+                    <m:r>
+                      <a:rPr lang="en-CA" b="0" i="1" smtClean="0">
+                        <a:latin typeface="+mn-lt"/>
+                      </a:rPr>
+                      <m:t> </m:t>
+                    </m:r>
+                    <m:r>
+                      <a:rPr lang="en-CA" b="0" i="1" smtClean="0">
+                        <a:latin typeface="+mn-lt"/>
+                      </a:rPr>
+                      <m:t>𝐻𝑎𝑝𝑝𝑒𝑛𝑖𝑛𝑔</m:t>
+                    </m:r>
+                    <m:r>
+                      <a:rPr lang="en-CA" b="0" i="1" smtClean="0">
+                        <a:latin typeface="+mn-lt"/>
+                      </a:rPr>
+                      <m:t> </m:t>
+                    </m:r>
+                    <m:r>
+                      <a:rPr lang="en-CA" b="0" i="1" smtClean="0">
+                        <a:latin typeface="+mn-lt"/>
+                      </a:rPr>
+                      <m:t>𝐺𝑖𝑣𝑒𝑛</m:t>
+                    </m:r>
+                    <m:r>
+                      <a:rPr lang="en-CA" b="0" i="1" smtClean="0">
+                        <a:latin typeface="+mn-lt"/>
+                      </a:rPr>
+                      <m:t> </m:t>
+                    </m:r>
+                    <m:r>
+                      <a:rPr lang="en-CA" b="0" i="1" smtClean="0">
+                        <a:latin typeface="Cambria Math"/>
+                      </a:rPr>
+                      <m:t>𝐷</m:t>
+                    </m:r>
+                    <m:r>
+                      <a:rPr lang="en-CA" b="0" i="1" smtClean="0">
+                        <a:latin typeface="+mn-lt"/>
+                      </a:rPr>
+                      <m:t> </m:t>
+                    </m:r>
+                    <m:r>
+                      <a:rPr lang="en-CA" b="0" i="1" smtClean="0">
+                        <a:latin typeface="+mn-lt"/>
+                      </a:rPr>
+                      <m:t>𝐻𝑎𝑝𝑝𝑒𝑛𝑒𝑑</m:t>
+                    </m:r>
+                    <m:r>
+                      <a:rPr lang="en-CA" b="0" i="1" smtClean="0">
+                        <a:latin typeface="+mn-lt"/>
+                      </a:rPr>
+                      <m:t>)= </m:t>
+                    </m:r>
+                    <m:f>
+                      <m:fPr>
+                        <m:ctrlPr>
+                          <a:rPr lang="en-CA" b="0" i="1" smtClean="0">
+                            <a:latin typeface="+mn-lt"/>
+                          </a:rPr>
+                        </m:ctrlPr>
+                      </m:fPr>
+                      <m:num>
+                        <m:r>
+                          <a:rPr lang="en-CA" b="0" i="1" smtClean="0">
+                            <a:latin typeface="+mn-lt"/>
+                          </a:rPr>
+                          <m:t>𝑃</m:t>
+                        </m:r>
+                        <m:r>
+                          <a:rPr lang="en-CA" b="0" i="1" smtClean="0">
+                            <a:latin typeface="+mn-lt"/>
+                          </a:rPr>
+                          <m:t>(</m:t>
+                        </m:r>
+                        <m:r>
+                          <a:rPr lang="en-CA" b="0" i="1" smtClean="0">
+                            <a:latin typeface="Cambria Math"/>
+                          </a:rPr>
+                          <m:t>𝐶</m:t>
+                        </m:r>
+                        <m:r>
+                          <a:rPr lang="en-CA" b="0" i="1" smtClean="0">
+                            <a:latin typeface="+mn-lt"/>
+                          </a:rPr>
+                          <m:t> </m:t>
+                        </m:r>
+                        <m:r>
+                          <a:rPr lang="en-CA" b="0" i="1" smtClean="0">
+                            <a:latin typeface="+mn-lt"/>
+                          </a:rPr>
+                          <m:t>𝑎𝑛𝑑</m:t>
+                        </m:r>
+                        <m:r>
+                          <a:rPr lang="en-CA" b="0" i="1" smtClean="0">
+                            <a:latin typeface="+mn-lt"/>
+                          </a:rPr>
+                          <m:t> </m:t>
+                        </m:r>
+                        <m:r>
+                          <a:rPr lang="en-CA" b="0" i="1" smtClean="0">
+                            <a:latin typeface="Cambria Math"/>
+                          </a:rPr>
+                          <m:t>𝐷</m:t>
+                        </m:r>
+                        <m:r>
+                          <a:rPr lang="en-CA" b="0" i="1" smtClean="0">
+                            <a:latin typeface="+mn-lt"/>
+                          </a:rPr>
+                          <m:t> </m:t>
+                        </m:r>
+                        <m:r>
+                          <a:rPr lang="en-CA" b="0" i="1" smtClean="0">
+                            <a:latin typeface="+mn-lt"/>
+                          </a:rPr>
+                          <m:t>𝑏𝑜𝑡h</m:t>
+                        </m:r>
+                        <m:r>
+                          <a:rPr lang="en-CA" b="0" i="1" smtClean="0">
+                            <a:latin typeface="+mn-lt"/>
+                          </a:rPr>
+                          <m:t> </m:t>
+                        </m:r>
+                        <m:r>
+                          <a:rPr lang="en-CA" b="0" i="1" smtClean="0">
+                            <a:latin typeface="+mn-lt"/>
+                          </a:rPr>
+                          <m:t>h𝑎𝑝𝑝𝑒𝑛𝑖𝑛𝑔</m:t>
+                        </m:r>
+                        <m:r>
+                          <a:rPr lang="en-CA" b="0" i="1" smtClean="0">
+                            <a:latin typeface="+mn-lt"/>
+                          </a:rPr>
+                          <m:t>)</m:t>
+                        </m:r>
+                      </m:num>
+                      <m:den>
+                        <m:r>
+                          <a:rPr lang="en-CA" b="0" i="1" smtClean="0">
+                            <a:latin typeface="+mn-lt"/>
+                          </a:rPr>
+                          <m:t>𝑃</m:t>
+                        </m:r>
+                        <m:r>
+                          <a:rPr lang="en-CA" b="0" i="1" smtClean="0">
+                            <a:latin typeface="+mn-lt"/>
+                          </a:rPr>
+                          <m:t>(</m:t>
+                        </m:r>
+                        <m:r>
+                          <a:rPr lang="en-CA" b="0" i="1" smtClean="0">
+                            <a:latin typeface="Cambria Math"/>
+                          </a:rPr>
+                          <m:t>𝐷</m:t>
+                        </m:r>
+                        <m:r>
+                          <a:rPr lang="en-CA" b="0" i="1" smtClean="0">
+                            <a:latin typeface="+mn-lt"/>
+                          </a:rPr>
+                          <m:t> </m:t>
+                        </m:r>
+                        <m:r>
+                          <a:rPr lang="en-CA" b="0" i="1" smtClean="0">
+                            <a:latin typeface="+mn-lt"/>
+                          </a:rPr>
+                          <m:t>h𝑎𝑝𝑝𝑒𝑛𝑖𝑛𝑔</m:t>
+                        </m:r>
+                        <m:r>
+                          <a:rPr lang="en-CA" b="0" i="1" smtClean="0">
+                            <a:latin typeface="+mn-lt"/>
+                          </a:rPr>
+                          <m:t>)</m:t>
+                        </m:r>
+                      </m:den>
+                    </m:f>
+                  </m:oMath>
+                </a14:m>
+                <a:endParaRPr lang="en-CA" dirty="0" smtClean="0">
+                  <a:latin typeface="+mn-lt"/>
+                </a:endParaRPr>
+              </a:p>
+              <a:p>
+                <a:pPr lvl="1"/>
+                <a:r>
+                  <a:rPr lang="en-CA" dirty="0" smtClean="0">
+                    <a:latin typeface="+mn-lt"/>
+                  </a:rPr>
+                  <a:t>Out of scope for Data 8, but in probability theory we write the above as P(C|D) = </a:t>
+                </a:r>
+                <a14:m>
+                  <m:oMath xmlns:m="http://schemas.openxmlformats.org/officeDocument/2006/math">
+                    <m:r>
+                      <m:rPr>
+                        <m:sty m:val="p"/>
+                      </m:rPr>
+                      <a:rPr lang="en-CA" b="0" i="0" smtClean="0">
+                        <a:latin typeface="+mn-lt"/>
+                      </a:rPr>
+                      <m:t>P</m:t>
+                    </m:r>
+                    <m:d>
+                      <m:dPr>
+                        <m:ctrlPr>
+                          <a:rPr lang="en-CA" b="0" i="1" smtClean="0">
+                            <a:latin typeface="+mn-lt"/>
+                          </a:rPr>
+                        </m:ctrlPr>
+                      </m:dPr>
+                      <m:e>
+                        <m:r>
+                          <a:rPr lang="en-CA" b="0" i="1" smtClean="0">
+                            <a:latin typeface="Cambria Math"/>
+                          </a:rPr>
+                          <m:t>𝐶</m:t>
+                        </m:r>
+                      </m:e>
+                      <m:e>
+                        <m:r>
+                          <a:rPr lang="en-CA" b="0" i="1" smtClean="0">
+                            <a:latin typeface="Cambria Math"/>
+                          </a:rPr>
+                          <m:t>𝐷</m:t>
+                        </m:r>
+                      </m:e>
+                    </m:d>
+                    <m:r>
+                      <a:rPr lang="en-CA" i="1">
+                        <a:latin typeface="+mn-lt"/>
+                      </a:rPr>
+                      <m:t>= </m:t>
+                    </m:r>
+                    <m:f>
+                      <m:fPr>
+                        <m:ctrlPr>
+                          <a:rPr lang="en-CA" i="1">
+                            <a:latin typeface="+mn-lt"/>
+                          </a:rPr>
+                        </m:ctrlPr>
+                      </m:fPr>
+                      <m:num>
+                        <m:r>
+                          <a:rPr lang="en-CA" i="1">
+                            <a:latin typeface="+mn-lt"/>
+                          </a:rPr>
+                          <m:t>𝑃</m:t>
+                        </m:r>
+                        <m:d>
+                          <m:dPr>
+                            <m:ctrlPr>
+                              <a:rPr lang="en-CA" i="1">
+                                <a:latin typeface="+mn-lt"/>
+                              </a:rPr>
+                            </m:ctrlPr>
+                          </m:dPr>
+                          <m:e>
+                            <m:r>
+                              <a:rPr lang="en-CA" b="0" i="1" smtClean="0">
+                                <a:latin typeface="Cambria Math"/>
+                              </a:rPr>
+                              <m:t>𝐶𝐷</m:t>
+                            </m:r>
+                          </m:e>
+                        </m:d>
+                      </m:num>
+                      <m:den>
+                        <m:r>
+                          <a:rPr lang="en-CA" i="1">
+                            <a:latin typeface="+mn-lt"/>
+                          </a:rPr>
+                          <m:t>𝑃</m:t>
+                        </m:r>
+                        <m:d>
+                          <m:dPr>
+                            <m:ctrlPr>
+                              <a:rPr lang="en-CA" i="1">
+                                <a:latin typeface="+mn-lt"/>
+                              </a:rPr>
+                            </m:ctrlPr>
+                          </m:dPr>
+                          <m:e>
+                            <m:r>
+                              <a:rPr lang="en-CA" b="0" i="1" smtClean="0">
+                                <a:latin typeface="Cambria Math"/>
+                              </a:rPr>
+                              <m:t>𝐷</m:t>
+                            </m:r>
+                          </m:e>
+                        </m:d>
+                      </m:den>
+                    </m:f>
+                  </m:oMath>
+                </a14:m>
+                <a:endParaRPr lang="en-CA" dirty="0" smtClean="0">
+                  <a:latin typeface="+mn-lt"/>
+                </a:endParaRPr>
+              </a:p>
+              <a:p>
+                <a:r>
+                  <a:rPr lang="en-CA" dirty="0" smtClean="0">
+                    <a:latin typeface="+mn-lt"/>
+                  </a:rPr>
+                  <a:t>Note that </a:t>
+                </a:r>
+                <a:r>
+                  <a:rPr lang="en-CA" dirty="0" smtClean="0">
+                    <a:latin typeface="+mn-lt"/>
+                  </a:rPr>
+                  <a:t>P(D happening) = P(C and D both happening) +</a:t>
+                </a:r>
+                <a:r>
+                  <a:rPr lang="en-CA" dirty="0">
+                    <a:latin typeface="+mn-lt"/>
+                  </a:rPr>
+                  <a:t> </a:t>
+                </a:r>
+                <a:r>
+                  <a:rPr lang="en-CA" dirty="0" smtClean="0">
+                    <a:latin typeface="+mn-lt"/>
+                  </a:rPr>
+                  <a:t>P(D happens but C does not happen)</a:t>
+                </a:r>
+              </a:p>
+              <a:p>
+                <a:endParaRPr lang="en-CA" dirty="0" smtClean="0">
+                  <a:latin typeface="+mn-lt"/>
+                </a:endParaRPr>
+              </a:p>
+            </p:txBody>
+          </p:sp>
+        </mc:Choice>
+        <mc:Fallback>
+          <p:sp>
+            <p:nvSpPr>
+              <p:cNvPr id="3" name="Content Placeholder 2"/>
+              <p:cNvSpPr>
+                <a:spLocks noGrp="1" noRot="1" noChangeAspect="1" noMove="1" noResize="1" noEditPoints="1" noAdjustHandles="1" noChangeArrowheads="1" noChangeShapeType="1" noTextEdit="1"/>
+              </p:cNvSpPr>
+              <p:nvPr>
+                <p:ph idx="1"/>
+              </p:nvPr>
+            </p:nvSpPr>
+            <p:spPr>
+              <a:xfrm>
+                <a:off x="457200" y="1756947"/>
+                <a:ext cx="8286750" cy="3681828"/>
+              </a:xfrm>
+              <a:blipFill rotWithShape="1">
+                <a:blip r:embed="rId2"/>
+                <a:stretch>
+                  <a:fillRect l="-809" t="-993" r="-1840"/>
+                </a:stretch>
+              </a:blipFill>
+            </p:spPr>
+            <p:txBody>
+              <a:bodyPr/>
+              <a:lstStyle/>
+              <a:p>
+                <a:r>
+                  <a:rPr lang="en-CA">
+                    <a:noFill/>
+                  </a:rPr>
+                  <a:t> </a:t>
+                </a:r>
+              </a:p>
+            </p:txBody>
+          </p:sp>
+        </mc:Fallback>
+      </mc:AlternateContent>
     </p:spTree>
     <p:extLst>
       <p:ext uri="{BB962C8B-B14F-4D97-AF65-F5344CB8AC3E}">
-        <p14:creationId xmlns:p14="http://schemas.microsoft.com/office/powerpoint/2010/main" val="203414778"/>
+        <p14:creationId xmlns:p14="http://schemas.microsoft.com/office/powerpoint/2010/main" val="2621854187"/>
+      </p:ext>
+    </p:extLst>
+  </p:cSld>
+  <p:clrMapOvr>
+    <a:masterClrMapping/>
+  </p:clrMapOvr>
+  <p:timing>
+    <p:tnLst>
+      <p:par>
+        <p:cTn id="1" dur="indefinite" restart="never" nodeType="tmRoot"/>
+      </p:par>
+    </p:tnLst>
+  </p:timing>
+</p:sld>
+</file>
+
+<file path=ppt/slides/slide9.xml><?xml version="1.0" encoding="utf-8"?>
+<p:sld xmlns:a="http://schemas.openxmlformats.org/drawingml/2006/main" xmlns:r="http://schemas.openxmlformats.org/officeDocument/2006/relationships" xmlns:p="http://schemas.openxmlformats.org/presentationml/2006/main">
+  <p:cSld>
+    <p:spTree>
+      <p:nvGrpSpPr>
+        <p:cNvPr id="1" name=""/>
+        <p:cNvGrpSpPr/>
+        <p:nvPr/>
+      </p:nvGrpSpPr>
+      <p:grpSpPr>
+        <a:xfrm>
+          <a:off x="0" y="0"/>
+          <a:ext cx="0" cy="0"/>
+          <a:chOff x="0" y="0"/>
+          <a:chExt cx="0" cy="0"/>
+        </a:xfrm>
+      </p:grpSpPr>
+      <p:sp>
+        <p:nvSpPr>
+          <p:cNvPr id="2" name="Title 1"/>
+          <p:cNvSpPr>
+            <a:spLocks noGrp="1"/>
+          </p:cNvSpPr>
+          <p:nvPr>
+            <p:ph type="title"/>
+          </p:nvPr>
+        </p:nvSpPr>
+        <p:spPr>
+          <a:xfrm>
+            <a:off x="457200" y="449932"/>
+            <a:ext cx="8286750" cy="1150353"/>
+          </a:xfrm>
+        </p:spPr>
+        <p:txBody>
+          <a:bodyPr>
+            <a:normAutofit/>
+          </a:bodyPr>
+          <a:lstStyle/>
+          <a:p>
+            <a:r>
+              <a:rPr lang="en-CA" sz="3600" dirty="0" smtClean="0">
+                <a:latin typeface="+mn-lt"/>
+              </a:rPr>
+              <a:t>Conditional Probability Example (Q2b)</a:t>
+            </a:r>
+            <a:endParaRPr lang="en-CA" sz="3600" dirty="0">
+              <a:latin typeface="+mn-lt"/>
+            </a:endParaRPr>
+          </a:p>
+        </p:txBody>
+      </p:sp>
+      <p:pic>
+        <p:nvPicPr>
+          <p:cNvPr id="1026" name="Picture 2"/>
+          <p:cNvPicPr>
+            <a:picLocks noGrp="1" noChangeAspect="1" noChangeArrowheads="1"/>
+          </p:cNvPicPr>
+          <p:nvPr>
+            <p:ph idx="1"/>
+          </p:nvPr>
+        </p:nvPicPr>
+        <p:blipFill>
+          <a:blip r:embed="rId2">
+            <a:extLst>
+              <a:ext uri="{28A0092B-C50C-407E-A947-70E740481C1C}">
+                <a14:useLocalDpi xmlns:a14="http://schemas.microsoft.com/office/drawing/2010/main" val="0"/>
+              </a:ext>
+            </a:extLst>
+          </a:blip>
+          <a:srcRect/>
+          <a:stretch>
+            <a:fillRect/>
+          </a:stretch>
+        </p:blipFill>
+        <p:spPr bwMode="auto">
+          <a:xfrm>
+            <a:off x="1563742" y="1548225"/>
+            <a:ext cx="6073666" cy="1470787"/>
+          </a:xfrm>
+          <a:prstGeom prst="rect">
+            <a:avLst/>
+          </a:prstGeom>
+          <a:noFill/>
+          <a:ln>
+            <a:noFill/>
+          </a:ln>
+          <a:effectLst/>
+          <a:extLst>
+            <a:ext uri="{909E8E84-426E-40DD-AFC4-6F175D3DCCD1}">
+              <a14:hiddenFill xmlns:a14="http://schemas.microsoft.com/office/drawing/2010/main">
+                <a:solidFill>
+                  <a:schemeClr val="accent1"/>
+                </a:solidFill>
+              </a14:hiddenFill>
+            </a:ext>
+            <a:ext uri="{91240B29-F687-4F45-9708-019B960494DF}">
+              <a14:hiddenLine xmlns:a14="http://schemas.microsoft.com/office/drawing/2010/main" w="9525">
+                <a:solidFill>
+                  <a:schemeClr val="tx1"/>
+                </a:solidFill>
+                <a:miter lim="800000"/>
+                <a:headEnd/>
+                <a:tailEnd/>
+              </a14:hiddenLine>
+            </a:ext>
+            <a:ext uri="{AF507438-7753-43E0-B8FC-AC1667EBCBE1}">
+              <a14:hiddenEffects xmlns:a14="http://schemas.microsoft.com/office/drawing/2010/main">
+                <a:effectLst>
+                  <a:outerShdw dist="35921" dir="2700000" algn="ctr" rotWithShape="0">
+                    <a:schemeClr val="bg2"/>
+                  </a:outerShdw>
+                </a:effectLst>
+              </a14:hiddenEffects>
+            </a:ext>
+          </a:extLst>
+        </p:spPr>
+      </p:pic>
+      <mc:AlternateContent xmlns:mc="http://schemas.openxmlformats.org/markup-compatibility/2006">
+        <mc:Choice xmlns:a14="http://schemas.microsoft.com/office/drawing/2010/main" Requires="a14">
+          <p:sp>
+            <p:nvSpPr>
+              <p:cNvPr id="4" name="TextBox 3"/>
+              <p:cNvSpPr txBox="1"/>
+              <p:nvPr/>
+            </p:nvSpPr>
+            <p:spPr>
+              <a:xfrm>
+                <a:off x="457200" y="2942812"/>
+                <a:ext cx="8105775" cy="2697983"/>
+              </a:xfrm>
+              <a:prstGeom prst="rect">
+                <a:avLst/>
+              </a:prstGeom>
+              <a:noFill/>
+            </p:spPr>
+            <p:txBody>
+              <a:bodyPr wrap="square" rtlCol="0">
+                <a:spAutoFit/>
+              </a:bodyPr>
+              <a:lstStyle/>
+              <a:p>
+                <a:r>
+                  <a:rPr lang="en-CA" dirty="0" smtClean="0">
+                    <a:solidFill>
+                      <a:srgbClr val="2D637F"/>
+                    </a:solidFill>
+                  </a:rPr>
+                  <a:t>Question: Given </a:t>
+                </a:r>
+                <a:r>
+                  <a:rPr lang="en-CA" dirty="0">
+                    <a:solidFill>
+                      <a:srgbClr val="2D637F"/>
+                    </a:solidFill>
+                  </a:rPr>
+                  <a:t>that a customer was classified incorrectly, the likelihood that they are a B type customer  </a:t>
+                </a:r>
+                <a:endParaRPr lang="en-CA" dirty="0" smtClean="0">
+                  <a:solidFill>
+                    <a:srgbClr val="2D637F"/>
+                  </a:solidFill>
+                </a:endParaRPr>
+              </a:p>
+              <a:p>
+                <a:endParaRPr lang="en-CA" dirty="0">
+                  <a:solidFill>
+                    <a:srgbClr val="2D637F"/>
+                  </a:solidFill>
+                </a:endParaRPr>
+              </a:p>
+              <a:p>
+                <a:r>
+                  <a:rPr lang="en-CA" dirty="0" smtClean="0">
+                    <a:solidFill>
+                      <a:srgbClr val="2D637F"/>
+                    </a:solidFill>
+                  </a:rPr>
+                  <a:t>P(Type B customer given classified incorrectly)</a:t>
+                </a:r>
+              </a:p>
+              <a:p>
+                <a:r>
+                  <a:rPr lang="en-CA" dirty="0" smtClean="0">
+                    <a:solidFill>
+                      <a:srgbClr val="2D637F"/>
+                    </a:solidFill>
+                  </a:rPr>
+                  <a:t> 	=</a:t>
+                </a:r>
+                <a14:m>
+                  <m:oMath xmlns:m="http://schemas.openxmlformats.org/officeDocument/2006/math">
+                    <m:f>
+                      <m:fPr>
+                        <m:ctrlPr>
+                          <a:rPr lang="en-CA" i="1" smtClean="0">
+                            <a:solidFill>
+                              <a:srgbClr val="2D637F"/>
+                            </a:solidFill>
+                          </a:rPr>
+                        </m:ctrlPr>
+                      </m:fPr>
+                      <m:num>
+                        <m:r>
+                          <a:rPr lang="en-CA" b="0" i="1" smtClean="0">
+                            <a:solidFill>
+                              <a:srgbClr val="2D637F"/>
+                            </a:solidFill>
+                          </a:rPr>
+                          <m:t>𝑃</m:t>
+                        </m:r>
+                        <m:r>
+                          <a:rPr lang="en-CA" b="0" i="1" smtClean="0">
+                            <a:solidFill>
+                              <a:srgbClr val="2D637F"/>
+                            </a:solidFill>
+                          </a:rPr>
+                          <m:t>(</m:t>
+                        </m:r>
+                        <m:r>
+                          <a:rPr lang="en-CA" b="0" i="1" smtClean="0">
+                            <a:solidFill>
+                              <a:srgbClr val="2D637F"/>
+                            </a:solidFill>
+                          </a:rPr>
+                          <m:t>𝑇𝑦𝑝𝑒</m:t>
+                        </m:r>
+                        <m:r>
+                          <a:rPr lang="en-CA" b="0" i="1" smtClean="0">
+                            <a:solidFill>
+                              <a:srgbClr val="2D637F"/>
+                            </a:solidFill>
+                          </a:rPr>
+                          <m:t> </m:t>
+                        </m:r>
+                        <m:r>
+                          <a:rPr lang="en-CA" b="0" i="1" smtClean="0">
+                            <a:solidFill>
+                              <a:srgbClr val="2D637F"/>
+                            </a:solidFill>
+                          </a:rPr>
+                          <m:t>𝐵</m:t>
+                        </m:r>
+                        <m:r>
+                          <a:rPr lang="en-CA" b="0" i="1" smtClean="0">
+                            <a:solidFill>
+                              <a:srgbClr val="2D637F"/>
+                            </a:solidFill>
+                          </a:rPr>
+                          <m:t> </m:t>
+                        </m:r>
+                        <m:r>
+                          <a:rPr lang="en-CA" b="0" i="1" smtClean="0">
+                            <a:solidFill>
+                              <a:srgbClr val="2D637F"/>
+                            </a:solidFill>
+                          </a:rPr>
+                          <m:t>𝑐𝑢𝑠𝑡𝑜𝑚𝑒𝑟</m:t>
+                        </m:r>
+                        <m:r>
+                          <a:rPr lang="en-CA" b="0" i="1" smtClean="0">
+                            <a:solidFill>
+                              <a:srgbClr val="2D637F"/>
+                            </a:solidFill>
+                          </a:rPr>
+                          <m:t> </m:t>
+                        </m:r>
+                        <m:r>
+                          <a:rPr lang="en-CA" b="0" i="1" smtClean="0">
+                            <a:solidFill>
+                              <a:srgbClr val="2D637F"/>
+                            </a:solidFill>
+                          </a:rPr>
+                          <m:t>𝑐𝑙𝑎𝑠𝑠𝑖𝑓𝑖𝑒𝑑</m:t>
+                        </m:r>
+                        <m:r>
+                          <a:rPr lang="en-CA" b="0" i="1" smtClean="0">
+                            <a:solidFill>
+                              <a:srgbClr val="2D637F"/>
+                            </a:solidFill>
+                          </a:rPr>
+                          <m:t> </m:t>
+                        </m:r>
+                        <m:r>
+                          <a:rPr lang="en-CA" b="0" i="1" smtClean="0">
+                            <a:solidFill>
+                              <a:srgbClr val="2D637F"/>
+                            </a:solidFill>
+                          </a:rPr>
+                          <m:t>𝑖𝑛𝑐𝑜𝑟𝑟𝑒𝑐𝑡𝑙𝑦</m:t>
+                        </m:r>
+                        <m:r>
+                          <a:rPr lang="en-CA" b="0" i="1" smtClean="0">
+                            <a:solidFill>
+                              <a:srgbClr val="2D637F"/>
+                            </a:solidFill>
+                          </a:rPr>
+                          <m:t>)</m:t>
+                        </m:r>
+                      </m:num>
+                      <m:den>
+                        <m:r>
+                          <a:rPr lang="en-CA" b="0" i="1" smtClean="0">
+                            <a:solidFill>
+                              <a:srgbClr val="2D637F"/>
+                            </a:solidFill>
+                          </a:rPr>
+                          <m:t>𝑃</m:t>
+                        </m:r>
+                        <m:r>
+                          <a:rPr lang="en-CA" b="0" i="1" smtClean="0">
+                            <a:solidFill>
+                              <a:srgbClr val="2D637F"/>
+                            </a:solidFill>
+                          </a:rPr>
+                          <m:t>(</m:t>
+                        </m:r>
+                        <m:r>
+                          <a:rPr lang="en-CA" b="0" i="1" smtClean="0">
+                            <a:solidFill>
+                              <a:srgbClr val="2D637F"/>
+                            </a:solidFill>
+                          </a:rPr>
+                          <m:t>𝐶𝑙𝑎𝑠𝑠𝑖𝑓𝑖𝑒𝑑</m:t>
+                        </m:r>
+                        <m:r>
+                          <a:rPr lang="en-CA" b="0" i="1" smtClean="0">
+                            <a:solidFill>
+                              <a:srgbClr val="2D637F"/>
+                            </a:solidFill>
+                          </a:rPr>
+                          <m:t> </m:t>
+                        </m:r>
+                        <m:r>
+                          <a:rPr lang="en-CA" b="0" i="1" smtClean="0">
+                            <a:solidFill>
+                              <a:srgbClr val="2D637F"/>
+                            </a:solidFill>
+                          </a:rPr>
+                          <m:t>𝑖𝑛𝑐𝑜𝑟𝑟𝑒𝑐𝑡𝑙𝑦</m:t>
+                        </m:r>
+                        <m:r>
+                          <a:rPr lang="en-CA" b="0" i="1" smtClean="0">
+                            <a:solidFill>
+                              <a:srgbClr val="2D637F"/>
+                            </a:solidFill>
+                          </a:rPr>
+                          <m:t>)</m:t>
+                        </m:r>
+                      </m:den>
+                    </m:f>
+                  </m:oMath>
+                </a14:m>
+                <a:r>
+                  <a:rPr lang="en-CA" dirty="0" smtClean="0">
+                    <a:solidFill>
+                      <a:srgbClr val="2D637F"/>
+                    </a:solidFill>
+                  </a:rPr>
+                  <a:t> </a:t>
+                </a:r>
+              </a:p>
+              <a:p>
+                <a:r>
+                  <a:rPr lang="en-CA" dirty="0" smtClean="0">
+                    <a:solidFill>
+                      <a:srgbClr val="2D637F"/>
+                    </a:solidFill>
+                  </a:rPr>
+                  <a:t>	= </a:t>
+                </a:r>
+                <a14:m>
+                  <m:oMath xmlns:m="http://schemas.openxmlformats.org/officeDocument/2006/math">
+                    <m:f>
+                      <m:fPr>
+                        <m:ctrlPr>
+                          <a:rPr lang="en-CA" i="1">
+                            <a:solidFill>
+                              <a:srgbClr val="2D637F"/>
+                            </a:solidFill>
+                          </a:rPr>
+                        </m:ctrlPr>
+                      </m:fPr>
+                      <m:num>
+                        <m:r>
+                          <a:rPr lang="en-CA" i="1">
+                            <a:solidFill>
+                              <a:srgbClr val="2D637F"/>
+                            </a:solidFill>
+                          </a:rPr>
+                          <m:t>𝑃</m:t>
+                        </m:r>
+                        <m:r>
+                          <a:rPr lang="en-CA" i="1">
+                            <a:solidFill>
+                              <a:srgbClr val="2D637F"/>
+                            </a:solidFill>
+                          </a:rPr>
+                          <m:t>(</m:t>
+                        </m:r>
+                        <m:r>
+                          <a:rPr lang="en-CA" i="1">
+                            <a:solidFill>
+                              <a:srgbClr val="2D637F"/>
+                            </a:solidFill>
+                          </a:rPr>
+                          <m:t>𝑇𝑦𝑝𝑒</m:t>
+                        </m:r>
+                        <m:r>
+                          <a:rPr lang="en-CA" i="1">
+                            <a:solidFill>
+                              <a:srgbClr val="2D637F"/>
+                            </a:solidFill>
+                          </a:rPr>
+                          <m:t> </m:t>
+                        </m:r>
+                        <m:r>
+                          <a:rPr lang="en-CA" i="1">
+                            <a:solidFill>
+                              <a:srgbClr val="2D637F"/>
+                            </a:solidFill>
+                          </a:rPr>
+                          <m:t>𝐵</m:t>
+                        </m:r>
+                        <m:r>
+                          <a:rPr lang="en-CA" i="1">
+                            <a:solidFill>
+                              <a:srgbClr val="2D637F"/>
+                            </a:solidFill>
+                          </a:rPr>
+                          <m:t> </m:t>
+                        </m:r>
+                        <m:r>
+                          <a:rPr lang="en-CA" i="1">
+                            <a:solidFill>
+                              <a:srgbClr val="2D637F"/>
+                            </a:solidFill>
+                          </a:rPr>
+                          <m:t>𝑐𝑢𝑠𝑡𝑜𝑚𝑒𝑟</m:t>
+                        </m:r>
+                        <m:r>
+                          <a:rPr lang="en-CA" i="1">
+                            <a:solidFill>
+                              <a:srgbClr val="2D637F"/>
+                            </a:solidFill>
+                          </a:rPr>
+                          <m:t> </m:t>
+                        </m:r>
+                        <m:r>
+                          <a:rPr lang="en-CA" i="1">
+                            <a:solidFill>
+                              <a:srgbClr val="2D637F"/>
+                            </a:solidFill>
+                          </a:rPr>
+                          <m:t>𝑐𝑙𝑎𝑠𝑠𝑖𝑓𝑖𝑒𝑑</m:t>
+                        </m:r>
+                        <m:r>
+                          <a:rPr lang="en-CA" i="1">
+                            <a:solidFill>
+                              <a:srgbClr val="2D637F"/>
+                            </a:solidFill>
+                          </a:rPr>
+                          <m:t> </m:t>
+                        </m:r>
+                        <m:r>
+                          <a:rPr lang="en-CA" i="1">
+                            <a:solidFill>
+                              <a:srgbClr val="2D637F"/>
+                            </a:solidFill>
+                          </a:rPr>
+                          <m:t>𝑖𝑛𝑐𝑜𝑟𝑟𝑒𝑐𝑡𝑙𝑦</m:t>
+                        </m:r>
+                        <m:r>
+                          <a:rPr lang="en-CA" i="1">
+                            <a:solidFill>
+                              <a:srgbClr val="2D637F"/>
+                            </a:solidFill>
+                          </a:rPr>
+                          <m:t>)</m:t>
+                        </m:r>
+                      </m:num>
+                      <m:den>
+                        <m:r>
+                          <a:rPr lang="en-CA" i="1">
+                            <a:solidFill>
+                              <a:srgbClr val="2D637F"/>
+                            </a:solidFill>
+                          </a:rPr>
+                          <m:t>𝑃</m:t>
+                        </m:r>
+                        <m:d>
+                          <m:dPr>
+                            <m:ctrlPr>
+                              <a:rPr lang="en-CA" i="1">
+                                <a:solidFill>
+                                  <a:srgbClr val="2D637F"/>
+                                </a:solidFill>
+                              </a:rPr>
+                            </m:ctrlPr>
+                          </m:dPr>
+                          <m:e>
+                            <m:r>
+                              <a:rPr lang="en-CA" b="0" i="1" smtClean="0">
+                                <a:solidFill>
+                                  <a:srgbClr val="2D637F"/>
+                                </a:solidFill>
+                              </a:rPr>
+                              <m:t>𝑇𝑦𝑝𝑒</m:t>
+                            </m:r>
+                            <m:r>
+                              <a:rPr lang="en-CA" b="0" i="1" smtClean="0">
+                                <a:solidFill>
+                                  <a:srgbClr val="2D637F"/>
+                                </a:solidFill>
+                              </a:rPr>
+                              <m:t> </m:t>
+                            </m:r>
+                            <m:r>
+                              <a:rPr lang="en-CA" b="0" i="1" smtClean="0">
+                                <a:solidFill>
+                                  <a:srgbClr val="2D637F"/>
+                                </a:solidFill>
+                              </a:rPr>
+                              <m:t>𝐴</m:t>
+                            </m:r>
+                            <m:r>
+                              <a:rPr lang="en-CA" b="0" i="1" smtClean="0">
+                                <a:solidFill>
+                                  <a:srgbClr val="2D637F"/>
+                                </a:solidFill>
+                              </a:rPr>
+                              <m:t> </m:t>
+                            </m:r>
+                            <m:r>
+                              <a:rPr lang="en-CA" b="0" i="1" smtClean="0">
+                                <a:solidFill>
+                                  <a:srgbClr val="2D637F"/>
+                                </a:solidFill>
+                              </a:rPr>
+                              <m:t>𝑐𝑢𝑠𝑡𝑜𝑚𝑒𝑟</m:t>
+                            </m:r>
+                            <m:r>
+                              <a:rPr lang="en-CA" b="0" i="1" smtClean="0">
+                                <a:solidFill>
+                                  <a:srgbClr val="2D637F"/>
+                                </a:solidFill>
+                              </a:rPr>
+                              <m:t> </m:t>
+                            </m:r>
+                            <m:r>
+                              <a:rPr lang="en-CA" b="0" i="1" smtClean="0">
+                                <a:solidFill>
+                                  <a:srgbClr val="2D637F"/>
+                                </a:solidFill>
+                              </a:rPr>
+                              <m:t>𝑐𝑙𝑎𝑠𝑠𝑖𝑓𝑖𝑒𝑑</m:t>
+                            </m:r>
+                            <m:r>
+                              <a:rPr lang="en-CA" i="1">
+                                <a:solidFill>
+                                  <a:srgbClr val="2D637F"/>
+                                </a:solidFill>
+                              </a:rPr>
+                              <m:t> </m:t>
+                            </m:r>
+                            <m:r>
+                              <a:rPr lang="en-CA" i="1">
+                                <a:solidFill>
+                                  <a:srgbClr val="2D637F"/>
+                                </a:solidFill>
+                              </a:rPr>
+                              <m:t>𝑖𝑛𝑐𝑜𝑟𝑟𝑒𝑐𝑡𝑙𝑦</m:t>
+                            </m:r>
+                          </m:e>
+                        </m:d>
+                        <m:r>
+                          <a:rPr lang="en-CA" b="0" i="1" smtClean="0">
+                            <a:solidFill>
+                              <a:srgbClr val="2D637F"/>
+                            </a:solidFill>
+                          </a:rPr>
+                          <m:t>+</m:t>
+                        </m:r>
+                        <m:r>
+                          <a:rPr lang="en-CA" i="1">
+                            <a:solidFill>
+                              <a:srgbClr val="2D637F"/>
+                            </a:solidFill>
+                          </a:rPr>
+                          <m:t>𝑃</m:t>
+                        </m:r>
+                        <m:r>
+                          <a:rPr lang="en-CA" i="1">
+                            <a:solidFill>
+                              <a:srgbClr val="2D637F"/>
+                            </a:solidFill>
+                          </a:rPr>
+                          <m:t>(</m:t>
+                        </m:r>
+                        <m:r>
+                          <a:rPr lang="en-CA" i="1">
+                            <a:solidFill>
+                              <a:srgbClr val="2D637F"/>
+                            </a:solidFill>
+                          </a:rPr>
+                          <m:t>𝑇𝑦𝑝𝑒</m:t>
+                        </m:r>
+                        <m:r>
+                          <a:rPr lang="en-CA" i="1">
+                            <a:solidFill>
+                              <a:srgbClr val="2D637F"/>
+                            </a:solidFill>
+                          </a:rPr>
+                          <m:t> </m:t>
+                        </m:r>
+                        <m:r>
+                          <a:rPr lang="en-CA" i="1">
+                            <a:solidFill>
+                              <a:srgbClr val="2D637F"/>
+                            </a:solidFill>
+                          </a:rPr>
+                          <m:t>𝐵</m:t>
+                        </m:r>
+                        <m:r>
+                          <a:rPr lang="en-CA" i="1">
+                            <a:solidFill>
+                              <a:srgbClr val="2D637F"/>
+                            </a:solidFill>
+                          </a:rPr>
+                          <m:t> </m:t>
+                        </m:r>
+                        <m:r>
+                          <a:rPr lang="en-CA" i="1">
+                            <a:solidFill>
+                              <a:srgbClr val="2D637F"/>
+                            </a:solidFill>
+                          </a:rPr>
+                          <m:t>𝑐𝑢𝑠𝑡𝑜𝑚𝑒𝑟</m:t>
+                        </m:r>
+                        <m:r>
+                          <a:rPr lang="en-CA" i="1">
+                            <a:solidFill>
+                              <a:srgbClr val="2D637F"/>
+                            </a:solidFill>
+                          </a:rPr>
+                          <m:t> </m:t>
+                        </m:r>
+                        <m:r>
+                          <a:rPr lang="en-CA" i="1">
+                            <a:solidFill>
+                              <a:srgbClr val="2D637F"/>
+                            </a:solidFill>
+                          </a:rPr>
+                          <m:t>𝑐𝑙𝑎𝑠𝑠𝑖𝑓𝑖𝑒𝑑</m:t>
+                        </m:r>
+                        <m:r>
+                          <a:rPr lang="en-CA" i="1">
+                            <a:solidFill>
+                              <a:srgbClr val="2D637F"/>
+                            </a:solidFill>
+                          </a:rPr>
+                          <m:t> </m:t>
+                        </m:r>
+                        <m:r>
+                          <a:rPr lang="en-CA" i="1">
+                            <a:solidFill>
+                              <a:srgbClr val="2D637F"/>
+                            </a:solidFill>
+                          </a:rPr>
+                          <m:t>𝑖𝑛𝑐𝑜𝑟𝑟𝑒𝑐𝑡𝑙𝑦</m:t>
+                        </m:r>
+                        <m:r>
+                          <a:rPr lang="en-CA" i="1">
+                            <a:solidFill>
+                              <a:srgbClr val="2D637F"/>
+                            </a:solidFill>
+                          </a:rPr>
+                          <m:t>)</m:t>
+                        </m:r>
+                      </m:den>
+                    </m:f>
+                  </m:oMath>
+                </a14:m>
+                <a:r>
+                  <a:rPr lang="en-CA" dirty="0">
+                    <a:solidFill>
+                      <a:srgbClr val="2D637F"/>
+                    </a:solidFill>
+                  </a:rPr>
+                  <a:t> </a:t>
+                </a:r>
+                <a:endParaRPr lang="en-CA" dirty="0" smtClean="0">
+                  <a:solidFill>
+                    <a:srgbClr val="2D637F"/>
+                  </a:solidFill>
+                </a:endParaRPr>
+              </a:p>
+              <a:p>
+                <a:r>
+                  <a:rPr lang="en-CA" dirty="0">
+                    <a:solidFill>
+                      <a:srgbClr val="2D637F"/>
+                    </a:solidFill>
+                  </a:rPr>
+                  <a:t>	</a:t>
+                </a:r>
+                <a:r>
+                  <a:rPr lang="en-CA" dirty="0" smtClean="0">
+                    <a:solidFill>
+                      <a:srgbClr val="2D637F"/>
+                    </a:solidFill>
+                  </a:rPr>
+                  <a:t>= </a:t>
+                </a:r>
+                <a14:m>
+                  <m:oMath xmlns:m="http://schemas.openxmlformats.org/officeDocument/2006/math">
+                    <m:f>
+                      <m:fPr>
+                        <m:ctrlPr>
+                          <a:rPr lang="en-CA" i="1">
+                            <a:solidFill>
+                              <a:srgbClr val="2D637F"/>
+                            </a:solidFill>
+                          </a:rPr>
+                        </m:ctrlPr>
+                      </m:fPr>
+                      <m:num>
+                        <m:f>
+                          <m:fPr>
+                            <m:ctrlPr>
+                              <a:rPr lang="en-CA" b="0" i="1" smtClean="0">
+                                <a:solidFill>
+                                  <a:srgbClr val="2D637F"/>
+                                </a:solidFill>
+                              </a:rPr>
+                            </m:ctrlPr>
+                          </m:fPr>
+                          <m:num>
+                            <m:r>
+                              <a:rPr lang="en-CA" b="0" i="1" smtClean="0">
+                                <a:solidFill>
+                                  <a:srgbClr val="2D637F"/>
+                                </a:solidFill>
+                              </a:rPr>
+                              <m:t>187</m:t>
+                            </m:r>
+                          </m:num>
+                          <m:den>
+                            <m:r>
+                              <a:rPr lang="en-CA" b="0" i="1" smtClean="0">
+                                <a:solidFill>
+                                  <a:srgbClr val="2D637F"/>
+                                </a:solidFill>
+                              </a:rPr>
+                              <m:t>1000</m:t>
+                            </m:r>
+                          </m:den>
+                        </m:f>
+                      </m:num>
+                      <m:den>
+                        <m:f>
+                          <m:fPr>
+                            <m:ctrlPr>
+                              <a:rPr lang="en-CA" b="0" i="1" smtClean="0">
+                                <a:solidFill>
+                                  <a:srgbClr val="2D637F"/>
+                                </a:solidFill>
+                              </a:rPr>
+                            </m:ctrlPr>
+                          </m:fPr>
+                          <m:num>
+                            <m:r>
+                              <a:rPr lang="en-CA" b="0" i="1" smtClean="0">
+                                <a:solidFill>
+                                  <a:srgbClr val="2D637F"/>
+                                </a:solidFill>
+                              </a:rPr>
+                              <m:t>104</m:t>
+                            </m:r>
+                          </m:num>
+                          <m:den>
+                            <m:r>
+                              <a:rPr lang="en-CA" b="0" i="1" smtClean="0">
+                                <a:solidFill>
+                                  <a:srgbClr val="2D637F"/>
+                                </a:solidFill>
+                              </a:rPr>
+                              <m:t>1000</m:t>
+                            </m:r>
+                          </m:den>
+                        </m:f>
+                        <m:r>
+                          <a:rPr lang="en-CA" b="0" i="1" smtClean="0">
+                            <a:solidFill>
+                              <a:srgbClr val="2D637F"/>
+                            </a:solidFill>
+                          </a:rPr>
+                          <m:t>+</m:t>
+                        </m:r>
+                        <m:f>
+                          <m:fPr>
+                            <m:ctrlPr>
+                              <a:rPr lang="en-CA" b="0" i="1" smtClean="0">
+                                <a:solidFill>
+                                  <a:srgbClr val="2D637F"/>
+                                </a:solidFill>
+                              </a:rPr>
+                            </m:ctrlPr>
+                          </m:fPr>
+                          <m:num>
+                            <m:r>
+                              <a:rPr lang="en-CA" b="0" i="1" smtClean="0">
+                                <a:solidFill>
+                                  <a:srgbClr val="2D637F"/>
+                                </a:solidFill>
+                              </a:rPr>
+                              <m:t>187</m:t>
+                            </m:r>
+                          </m:num>
+                          <m:den>
+                            <m:r>
+                              <a:rPr lang="en-CA" b="0" i="1" smtClean="0">
+                                <a:solidFill>
+                                  <a:srgbClr val="2D637F"/>
+                                </a:solidFill>
+                              </a:rPr>
+                              <m:t>1000</m:t>
+                            </m:r>
+                          </m:den>
+                        </m:f>
+                      </m:den>
+                    </m:f>
+                    <m:r>
+                      <a:rPr lang="en-CA" b="0" i="0" smtClean="0">
+                        <a:solidFill>
+                          <a:srgbClr val="2D637F"/>
+                        </a:solidFill>
+                      </a:rPr>
+                      <m:t>=</m:t>
+                    </m:r>
+                    <m:f>
+                      <m:fPr>
+                        <m:ctrlPr>
+                          <a:rPr lang="en-CA" b="0" i="1" smtClean="0">
+                            <a:solidFill>
+                              <a:srgbClr val="2D637F"/>
+                            </a:solidFill>
+                          </a:rPr>
+                        </m:ctrlPr>
+                      </m:fPr>
+                      <m:num>
+                        <m:r>
+                          <a:rPr lang="en-CA" b="0" i="1" smtClean="0">
+                            <a:solidFill>
+                              <a:srgbClr val="2D637F"/>
+                            </a:solidFill>
+                          </a:rPr>
+                          <m:t>187</m:t>
+                        </m:r>
+                      </m:num>
+                      <m:den>
+                        <m:r>
+                          <a:rPr lang="en-CA" b="0" i="1" smtClean="0">
+                            <a:solidFill>
+                              <a:srgbClr val="2D637F"/>
+                            </a:solidFill>
+                          </a:rPr>
+                          <m:t>104+187</m:t>
+                        </m:r>
+                      </m:den>
+                    </m:f>
+                    <m:r>
+                      <a:rPr lang="en-CA" b="0" i="1" smtClean="0">
+                        <a:solidFill>
+                          <a:srgbClr val="2D637F"/>
+                        </a:solidFill>
+                      </a:rPr>
+                      <m:t>= </m:t>
+                    </m:r>
+                    <m:f>
+                      <m:fPr>
+                        <m:ctrlPr>
+                          <a:rPr lang="en-CA" b="0" i="1" smtClean="0">
+                            <a:solidFill>
+                              <a:srgbClr val="2D637F"/>
+                            </a:solidFill>
+                          </a:rPr>
+                        </m:ctrlPr>
+                      </m:fPr>
+                      <m:num>
+                        <m:r>
+                          <a:rPr lang="en-CA" b="0" i="1" smtClean="0">
+                            <a:solidFill>
+                              <a:srgbClr val="2D637F"/>
+                            </a:solidFill>
+                          </a:rPr>
+                          <m:t>187</m:t>
+                        </m:r>
+                      </m:num>
+                      <m:den>
+                        <m:r>
+                          <a:rPr lang="en-CA" b="0" i="1" smtClean="0">
+                            <a:solidFill>
+                              <a:srgbClr val="2D637F"/>
+                            </a:solidFill>
+                          </a:rPr>
+                          <m:t>291</m:t>
+                        </m:r>
+                      </m:den>
+                    </m:f>
+                  </m:oMath>
+                </a14:m>
+                <a:endParaRPr lang="en-CA" dirty="0" smtClean="0">
+                  <a:solidFill>
+                    <a:srgbClr val="2D637F"/>
+                  </a:solidFill>
+                </a:endParaRPr>
+              </a:p>
+            </p:txBody>
+          </p:sp>
+        </mc:Choice>
+        <mc:Fallback>
+          <p:sp>
+            <p:nvSpPr>
+              <p:cNvPr id="4" name="TextBox 3"/>
+              <p:cNvSpPr txBox="1">
+                <a:spLocks noRot="1" noChangeAspect="1" noMove="1" noResize="1" noEditPoints="1" noAdjustHandles="1" noChangeArrowheads="1" noChangeShapeType="1" noTextEdit="1"/>
+              </p:cNvSpPr>
+              <p:nvPr/>
+            </p:nvSpPr>
+            <p:spPr>
+              <a:xfrm>
+                <a:off x="457200" y="2942812"/>
+                <a:ext cx="8105775" cy="2697983"/>
+              </a:xfrm>
+              <a:prstGeom prst="rect">
+                <a:avLst/>
+              </a:prstGeom>
+              <a:blipFill rotWithShape="1">
+                <a:blip r:embed="rId3"/>
+                <a:stretch>
+                  <a:fillRect l="-602" t="-1131"/>
+                </a:stretch>
+              </a:blipFill>
+            </p:spPr>
+            <p:txBody>
+              <a:bodyPr/>
+              <a:lstStyle/>
+              <a:p>
+                <a:r>
+                  <a:rPr lang="en-CA">
+                    <a:noFill/>
+                  </a:rPr>
+                  <a:t> </a:t>
+                </a:r>
+              </a:p>
+            </p:txBody>
+          </p:sp>
+        </mc:Fallback>
+      </mc:AlternateContent>
+    </p:spTree>
+    <p:extLst>
+      <p:ext uri="{BB962C8B-B14F-4D97-AF65-F5344CB8AC3E}">
+        <p14:creationId xmlns:p14="http://schemas.microsoft.com/office/powerpoint/2010/main" val="4229239097"/>
       </p:ext>
     </p:extLst>
   </p:cSld>

</xml_diff>